<commit_message>
Update Mottled Stars Literature Review.pptx
</commit_message>
<xml_diff>
--- a/FUSE - Mottled Stars/FUSE Literature Review/Mottled Stars Literature Review.pptx
+++ b/FUSE - Mottled Stars/FUSE Literature Review/Mottled Stars Literature Review.pptx
@@ -107,6 +107,11 @@
       </a:defRPr>
     </a:lvl9pPr>
   </p:defaultTextStyle>
+  <p:extLst>
+    <p:ext uri="{EFAFB233-063F-42B5-8137-9DF3F51BA10A}">
+      <p15:sldGuideLst xmlns:p15="http://schemas.microsoft.com/office/powerpoint/2012/main"/>
+    </p:ext>
+  </p:extLst>
 </p:presentation>
 </file>
 
@@ -280,7 +285,7 @@
           <a:p>
             <a:fld id="{EC08EBD6-2DE3-4022-8EC4-7DB415F76BF1}" type="datetimeFigureOut">
               <a:rPr lang="en-US" smtClean="0"/>
-              <a:t>6/11/2019</a:t>
+              <a:t>6/12/2019</a:t>
             </a:fld>
             <a:endParaRPr lang="en-US"/>
           </a:p>
@@ -547,7 +552,7 @@
           <a:p>
             <a:fld id="{EC08EBD6-2DE3-4022-8EC4-7DB415F76BF1}" type="datetimeFigureOut">
               <a:rPr lang="en-US" smtClean="0"/>
-              <a:t>6/11/2019</a:t>
+              <a:t>6/12/2019</a:t>
             </a:fld>
             <a:endParaRPr lang="en-US"/>
           </a:p>
@@ -778,7 +783,7 @@
           <a:p>
             <a:fld id="{EC08EBD6-2DE3-4022-8EC4-7DB415F76BF1}" type="datetimeFigureOut">
               <a:rPr lang="en-US" smtClean="0"/>
-              <a:t>6/11/2019</a:t>
+              <a:t>6/12/2019</a:t>
             </a:fld>
             <a:endParaRPr lang="en-US"/>
           </a:p>
@@ -1088,7 +1093,7 @@
           <a:p>
             <a:fld id="{EC08EBD6-2DE3-4022-8EC4-7DB415F76BF1}" type="datetimeFigureOut">
               <a:rPr lang="en-US" smtClean="0"/>
-              <a:t>6/11/2019</a:t>
+              <a:t>6/12/2019</a:t>
             </a:fld>
             <a:endParaRPr lang="en-US"/>
           </a:p>
@@ -1561,7 +1566,7 @@
           <a:p>
             <a:fld id="{EC08EBD6-2DE3-4022-8EC4-7DB415F76BF1}" type="datetimeFigureOut">
               <a:rPr lang="en-US" smtClean="0"/>
-              <a:t>6/11/2019</a:t>
+              <a:t>6/12/2019</a:t>
             </a:fld>
             <a:endParaRPr lang="en-US"/>
           </a:p>
@@ -2108,7 +2113,7 @@
           <a:p>
             <a:fld id="{EC08EBD6-2DE3-4022-8EC4-7DB415F76BF1}" type="datetimeFigureOut">
               <a:rPr lang="en-US" smtClean="0"/>
-              <a:t>6/11/2019</a:t>
+              <a:t>6/12/2019</a:t>
             </a:fld>
             <a:endParaRPr lang="en-US"/>
           </a:p>
@@ -2882,7 +2887,7 @@
           <a:p>
             <a:fld id="{EC08EBD6-2DE3-4022-8EC4-7DB415F76BF1}" type="datetimeFigureOut">
               <a:rPr lang="en-US" smtClean="0"/>
-              <a:t>6/11/2019</a:t>
+              <a:t>6/12/2019</a:t>
             </a:fld>
             <a:endParaRPr lang="en-US"/>
           </a:p>
@@ -3057,7 +3062,7 @@
           <a:p>
             <a:fld id="{EC08EBD6-2DE3-4022-8EC4-7DB415F76BF1}" type="datetimeFigureOut">
               <a:rPr lang="en-US" smtClean="0"/>
-              <a:t>6/11/2019</a:t>
+              <a:t>6/12/2019</a:t>
             </a:fld>
             <a:endParaRPr lang="en-US"/>
           </a:p>
@@ -3280,7 +3285,7 @@
           <a:p>
             <a:fld id="{EC08EBD6-2DE3-4022-8EC4-7DB415F76BF1}" type="datetimeFigureOut">
               <a:rPr lang="en-US" smtClean="0"/>
-              <a:t>6/11/2019</a:t>
+              <a:t>6/12/2019</a:t>
             </a:fld>
             <a:endParaRPr lang="en-US"/>
           </a:p>
@@ -3460,7 +3465,7 @@
           <a:p>
             <a:fld id="{EC08EBD6-2DE3-4022-8EC4-7DB415F76BF1}" type="datetimeFigureOut">
               <a:rPr lang="en-US" smtClean="0"/>
-              <a:t>6/11/2019</a:t>
+              <a:t>6/12/2019</a:t>
             </a:fld>
             <a:endParaRPr lang="en-US"/>
           </a:p>
@@ -3749,7 +3754,7 @@
           <a:p>
             <a:fld id="{EC08EBD6-2DE3-4022-8EC4-7DB415F76BF1}" type="datetimeFigureOut">
               <a:rPr lang="en-US" smtClean="0"/>
-              <a:t>6/11/2019</a:t>
+              <a:t>6/12/2019</a:t>
             </a:fld>
             <a:endParaRPr lang="en-US"/>
           </a:p>
@@ -3991,7 +3996,7 @@
           <a:p>
             <a:fld id="{EC08EBD6-2DE3-4022-8EC4-7DB415F76BF1}" type="datetimeFigureOut">
               <a:rPr lang="en-US" smtClean="0"/>
-              <a:t>6/11/2019</a:t>
+              <a:t>6/12/2019</a:t>
             </a:fld>
             <a:endParaRPr lang="en-US"/>
           </a:p>
@@ -4370,7 +4375,7 @@
           <a:p>
             <a:fld id="{EC08EBD6-2DE3-4022-8EC4-7DB415F76BF1}" type="datetimeFigureOut">
               <a:rPr lang="en-US" smtClean="0"/>
-              <a:t>6/11/2019</a:t>
+              <a:t>6/12/2019</a:t>
             </a:fld>
             <a:endParaRPr lang="en-US"/>
           </a:p>
@@ -4488,7 +4493,7 @@
           <a:p>
             <a:fld id="{EC08EBD6-2DE3-4022-8EC4-7DB415F76BF1}" type="datetimeFigureOut">
               <a:rPr lang="en-US" smtClean="0"/>
-              <a:t>6/11/2019</a:t>
+              <a:t>6/12/2019</a:t>
             </a:fld>
             <a:endParaRPr lang="en-US"/>
           </a:p>
@@ -4583,7 +4588,7 @@
           <a:p>
             <a:fld id="{EC08EBD6-2DE3-4022-8EC4-7DB415F76BF1}" type="datetimeFigureOut">
               <a:rPr lang="en-US" smtClean="0"/>
-              <a:t>6/11/2019</a:t>
+              <a:t>6/12/2019</a:t>
             </a:fld>
             <a:endParaRPr lang="en-US"/>
           </a:p>
@@ -4832,7 +4837,7 @@
           <a:p>
             <a:fld id="{EC08EBD6-2DE3-4022-8EC4-7DB415F76BF1}" type="datetimeFigureOut">
               <a:rPr lang="en-US" smtClean="0"/>
-              <a:t>6/11/2019</a:t>
+              <a:t>6/12/2019</a:t>
             </a:fld>
             <a:endParaRPr lang="en-US"/>
           </a:p>
@@ -5089,7 +5094,7 @@
           <a:p>
             <a:fld id="{EC08EBD6-2DE3-4022-8EC4-7DB415F76BF1}" type="datetimeFigureOut">
               <a:rPr lang="en-US" smtClean="0"/>
-              <a:t>6/11/2019</a:t>
+              <a:t>6/12/2019</a:t>
             </a:fld>
             <a:endParaRPr lang="en-US"/>
           </a:p>
@@ -5332,7 +5337,7 @@
           <a:p>
             <a:fld id="{EC08EBD6-2DE3-4022-8EC4-7DB415F76BF1}" type="datetimeFigureOut">
               <a:rPr lang="en-US" smtClean="0"/>
-              <a:t>6/11/2019</a:t>
+              <a:t>6/12/2019</a:t>
             </a:fld>
             <a:endParaRPr lang="en-US"/>
           </a:p>
@@ -5909,7 +5914,7 @@
           <a:p>
             <a:r>
               <a:rPr lang="en-US" dirty="0"/>
-              <a:t>Starspots or sunspots are dark blotches on the surface of stars (Gough 2010).</a:t>
+              <a:t>Starspots are dark blotches on the surface of stars (Gough 2010).</a:t>
             </a:r>
           </a:p>
           <a:p>
@@ -5921,7 +5926,7 @@
           <a:p>
             <a:r>
               <a:rPr lang="en-US" dirty="0"/>
-              <a:t>What causes these blemishes and their affects on the host star are not well understood.</a:t>
+              <a:t>Their causes and affects on their host star are not well understood.</a:t>
             </a:r>
           </a:p>
           <a:p>
@@ -6226,6 +6231,48 @@
           <a:bodyPr/>
           <a:lstStyle/>
           <a:p>
+            <a:r>
+              <a:rPr lang="en-US" dirty="0"/>
+              <a:t>Continuing a project dubbed Mottled Stars</a:t>
+            </a:r>
+          </a:p>
+          <a:p>
+            <a:r>
+              <a:rPr lang="en-US" dirty="0"/>
+              <a:t>In 2018, Dr. </a:t>
+            </a:r>
+            <a:r>
+              <a:rPr lang="en-US" dirty="0" err="1"/>
+              <a:t>Feiden</a:t>
+            </a:r>
+            <a:r>
+              <a:rPr lang="en-US" dirty="0"/>
+              <a:t> worked with first-year undergraduate Amanda Ash</a:t>
+            </a:r>
+          </a:p>
+          <a:p>
+            <a:pPr lvl="1"/>
+            <a:r>
+              <a:rPr lang="en-US" dirty="0"/>
+              <a:t>Title: Mottled Stars: Improving Age Estimates for Young Stars in the Planet Formation Era</a:t>
+            </a:r>
+          </a:p>
+          <a:p>
+            <a:pPr lvl="1"/>
+            <a:r>
+              <a:rPr lang="en-US" dirty="0"/>
+              <a:t>Their Findings: </a:t>
+            </a:r>
+          </a:p>
+          <a:p>
+            <a:pPr lvl="2"/>
+            <a:r>
+              <a:rPr lang="en-US" dirty="0"/>
+              <a:t>Showed (maybe for the first time) that starspots might just be transient features on the surface of some stars</a:t>
+            </a:r>
+          </a:p>
+          <a:p>
+            <a:pPr lvl="2"/>
             <a:endParaRPr lang="en-US" dirty="0"/>
           </a:p>
         </p:txBody>

</xml_diff>